<commit_message>
Middle of the class. Make some PowerPoint stuff
</commit_message>
<xml_diff>
--- a/Day2Day/Day_1 (Tues, June 27th, 2022)/INFO3111S22_W01_Course_Intro (long and boring PPT).pptx
+++ b/Day2Day/Day_1 (Tues, June 27th, 2022)/INFO3111S22_W01_Course_Intro (long and boring PPT).pptx
@@ -5,7 +5,7 @@
     <p:sldMasterId id="2147483648" r:id="rId1"/>
   </p:sldMasterIdLst>
   <p:notesMasterIdLst>
-    <p:notesMasterId r:id="rId43"/>
+    <p:notesMasterId r:id="rId45"/>
   </p:notesMasterIdLst>
   <p:sldIdLst>
     <p:sldId id="305" r:id="rId2"/>
@@ -49,6 +49,8 @@
     <p:sldId id="277" r:id="rId40"/>
     <p:sldId id="271" r:id="rId41"/>
     <p:sldId id="304" r:id="rId42"/>
+    <p:sldId id="322" r:id="rId43"/>
+    <p:sldId id="323" r:id="rId44"/>
   </p:sldIdLst>
   <p:sldSz cx="9144000" cy="5143500" type="screen16x9"/>
   <p:notesSz cx="6858000" cy="9144000"/>
@@ -17782,12 +17784,8 @@
               </a:lnSpc>
             </a:pPr>
             <a:r>
-              <a:rPr lang="en-US" sz="1800" dirty="0" err="1"/>
-              <a:t>atuo</a:t>
-            </a:r>
-            <a:r>
               <a:rPr lang="en-US" sz="1800" dirty="0"/>
-              <a:t>: why? It’s a strongly typed language (at compile time)</a:t>
+              <a:t>auto: why? It’s a strongly typed language (at compile time)</a:t>
             </a:r>
             <a:endParaRPr lang="en-US" sz="1800" u="sng" dirty="0"/>
           </a:p>
@@ -21160,6 +21158,17 @@
               <a:t>Midterm and final (each 30%)</a:t>
             </a:r>
           </a:p>
+          <a:p>
+            <a:pPr eaLnBrk="1" hangingPunct="1">
+              <a:lnSpc>
+                <a:spcPct val="90000"/>
+              </a:lnSpc>
+            </a:pPr>
+            <a:r>
+              <a:rPr lang="en-US" sz="2400" dirty="0"/>
+              <a:t>50% is a “pass” in this AND EVERY OTHER course.</a:t>
+            </a:r>
+          </a:p>
         </p:txBody>
       </p:sp>
       <p:sp>
@@ -21585,7 +21594,11 @@
                                           </p:stCondLst>
                                         </p:cTn>
                                         <p:tgtEl>
-                                          <p:spTgt spid="5"/>
+                                          <p:spTgt spid="121859">
+                                            <p:txEl>
+                                              <p:pRg st="7" end="7"/>
+                                            </p:txEl>
+                                          </p:spTgt>
                                         </p:tgtEl>
                                         <p:attrNameLst>
                                           <p:attrName>style.visibility</p:attrName>
@@ -21598,6 +21611,63 @@
                                     <p:animEffect transition="in" filter="checkerboard(across)">
                                       <p:cBhvr>
                                         <p:cTn id="32" dur="500"/>
+                                        <p:tgtEl>
+                                          <p:spTgt spid="121859">
+                                            <p:txEl>
+                                              <p:pRg st="7" end="7"/>
+                                            </p:txEl>
+                                          </p:spTgt>
+                                        </p:tgtEl>
+                                      </p:cBhvr>
+                                    </p:animEffect>
+                                  </p:childTnLst>
+                                </p:cTn>
+                              </p:par>
+                            </p:childTnLst>
+                          </p:cTn>
+                        </p:par>
+                      </p:childTnLst>
+                    </p:cTn>
+                  </p:par>
+                  <p:par>
+                    <p:cTn id="33" fill="hold">
+                      <p:stCondLst>
+                        <p:cond delay="indefinite"/>
+                      </p:stCondLst>
+                      <p:childTnLst>
+                        <p:par>
+                          <p:cTn id="34" fill="hold">
+                            <p:stCondLst>
+                              <p:cond delay="0"/>
+                            </p:stCondLst>
+                            <p:childTnLst>
+                              <p:par>
+                                <p:cTn id="35" presetID="5" presetClass="entr" presetSubtype="10" fill="hold" grpId="0" nodeType="clickEffect">
+                                  <p:stCondLst>
+                                    <p:cond delay="0"/>
+                                  </p:stCondLst>
+                                  <p:childTnLst>
+                                    <p:set>
+                                      <p:cBhvr>
+                                        <p:cTn id="36" dur="1" fill="hold">
+                                          <p:stCondLst>
+                                            <p:cond delay="0"/>
+                                          </p:stCondLst>
+                                        </p:cTn>
+                                        <p:tgtEl>
+                                          <p:spTgt spid="5"/>
+                                        </p:tgtEl>
+                                        <p:attrNameLst>
+                                          <p:attrName>style.visibility</p:attrName>
+                                        </p:attrNameLst>
+                                      </p:cBhvr>
+                                      <p:to>
+                                        <p:strVal val="visible"/>
+                                      </p:to>
+                                    </p:set>
+                                    <p:animEffect transition="in" filter="checkerboard(across)">
+                                      <p:cBhvr>
+                                        <p:cTn id="37" dur="500"/>
                                         <p:tgtEl>
                                           <p:spTgt spid="5"/>
                                         </p:tgtEl>
@@ -29875,7 +29945,952 @@
           <a:chExt cx="0" cy="0"/>
         </a:xfrm>
       </p:grpSpPr>
+      <p:sp>
+        <p:nvSpPr>
+          <p:cNvPr id="2" name="Rectangle: Rounded Corners 1">
+            <a:extLst>
+              <a:ext uri="{FF2B5EF4-FFF2-40B4-BE49-F238E27FC236}">
+                <a16:creationId xmlns:a16="http://schemas.microsoft.com/office/drawing/2014/main" id="{8AF543E8-848A-48B7-C86B-CABBF770EC40}"/>
+              </a:ext>
+            </a:extLst>
+          </p:cNvPr>
+          <p:cNvSpPr/>
+          <p:nvPr/>
+        </p:nvSpPr>
+        <p:spPr>
+          <a:xfrm>
+            <a:off x="467544" y="843558"/>
+            <a:ext cx="1656184" cy="720080"/>
+          </a:xfrm>
+          <a:prstGeom prst="roundRect">
+            <a:avLst/>
+          </a:prstGeom>
+        </p:spPr>
+        <p:style>
+          <a:lnRef idx="2">
+            <a:schemeClr val="accent1">
+              <a:shade val="50000"/>
+            </a:schemeClr>
+          </a:lnRef>
+          <a:fillRef idx="1">
+            <a:schemeClr val="accent1"/>
+          </a:fillRef>
+          <a:effectRef idx="0">
+            <a:schemeClr val="accent1"/>
+          </a:effectRef>
+          <a:fontRef idx="minor">
+            <a:schemeClr val="lt1"/>
+          </a:fontRef>
+        </p:style>
+        <p:txBody>
+          <a:bodyPr rtlCol="0" anchor="ctr"/>
+          <a:lstStyle/>
+          <a:p>
+            <a:pPr algn="ctr"/>
+            <a:r>
+              <a:rPr lang="en-US" dirty="0"/>
+              <a:t>CPU 4.0Gx16</a:t>
+            </a:r>
+            <a:endParaRPr lang="en-CA" dirty="0"/>
+          </a:p>
+        </p:txBody>
+      </p:sp>
+      <p:sp>
+        <p:nvSpPr>
+          <p:cNvPr id="3" name="Rectangle: Rounded Corners 2">
+            <a:extLst>
+              <a:ext uri="{FF2B5EF4-FFF2-40B4-BE49-F238E27FC236}">
+                <a16:creationId xmlns:a16="http://schemas.microsoft.com/office/drawing/2014/main" id="{4F737B90-70DF-0196-B3CA-CE42E35438A8}"/>
+              </a:ext>
+            </a:extLst>
+          </p:cNvPr>
+          <p:cNvSpPr/>
+          <p:nvPr/>
+        </p:nvSpPr>
+        <p:spPr>
+          <a:xfrm>
+            <a:off x="353815" y="2313806"/>
+            <a:ext cx="1867718" cy="720080"/>
+          </a:xfrm>
+          <a:prstGeom prst="roundRect">
+            <a:avLst/>
+          </a:prstGeom>
+        </p:spPr>
+        <p:style>
+          <a:lnRef idx="2">
+            <a:schemeClr val="accent1">
+              <a:shade val="50000"/>
+            </a:schemeClr>
+          </a:lnRef>
+          <a:fillRef idx="1">
+            <a:schemeClr val="accent1"/>
+          </a:fillRef>
+          <a:effectRef idx="0">
+            <a:schemeClr val="accent1"/>
+          </a:effectRef>
+          <a:fontRef idx="minor">
+            <a:schemeClr val="lt1"/>
+          </a:fontRef>
+        </p:style>
+        <p:txBody>
+          <a:bodyPr rtlCol="0" anchor="ctr"/>
+          <a:lstStyle/>
+          <a:p>
+            <a:pPr algn="ctr"/>
+            <a:r>
+              <a:rPr lang="en-US" dirty="0"/>
+              <a:t>RAM 32G</a:t>
+            </a:r>
+            <a:endParaRPr lang="en-CA" dirty="0"/>
+          </a:p>
+        </p:txBody>
+      </p:sp>
+      <p:sp>
+        <p:nvSpPr>
+          <p:cNvPr id="4" name="Arrow: Up-Down 3">
+            <a:extLst>
+              <a:ext uri="{FF2B5EF4-FFF2-40B4-BE49-F238E27FC236}">
+                <a16:creationId xmlns:a16="http://schemas.microsoft.com/office/drawing/2014/main" id="{FF4184F7-A774-D251-3547-E9CBD09893EE}"/>
+              </a:ext>
+            </a:extLst>
+          </p:cNvPr>
+          <p:cNvSpPr/>
+          <p:nvPr/>
+        </p:nvSpPr>
+        <p:spPr>
+          <a:xfrm>
+            <a:off x="971600" y="1563638"/>
+            <a:ext cx="648072" cy="720080"/>
+          </a:xfrm>
+          <a:prstGeom prst="upDownArrow">
+            <a:avLst>
+              <a:gd name="adj1" fmla="val 50000"/>
+              <a:gd name="adj2" fmla="val 26484"/>
+            </a:avLst>
+          </a:prstGeom>
+        </p:spPr>
+        <p:style>
+          <a:lnRef idx="2">
+            <a:schemeClr val="accent1">
+              <a:shade val="50000"/>
+            </a:schemeClr>
+          </a:lnRef>
+          <a:fillRef idx="1">
+            <a:schemeClr val="accent1"/>
+          </a:fillRef>
+          <a:effectRef idx="0">
+            <a:schemeClr val="accent1"/>
+          </a:effectRef>
+          <a:fontRef idx="minor">
+            <a:schemeClr val="lt1"/>
+          </a:fontRef>
+        </p:style>
+        <p:txBody>
+          <a:bodyPr rtlCol="0" anchor="ctr"/>
+          <a:lstStyle/>
+          <a:p>
+            <a:pPr algn="ctr"/>
+            <a:endParaRPr lang="en-CA"/>
+          </a:p>
+        </p:txBody>
+      </p:sp>
+      <p:sp>
+        <p:nvSpPr>
+          <p:cNvPr id="5" name="Rectangle: Rounded Corners 4">
+            <a:extLst>
+              <a:ext uri="{FF2B5EF4-FFF2-40B4-BE49-F238E27FC236}">
+                <a16:creationId xmlns:a16="http://schemas.microsoft.com/office/drawing/2014/main" id="{43E90C28-1CE6-C07F-0AF2-DC52F4CA3FC2}"/>
+              </a:ext>
+            </a:extLst>
+          </p:cNvPr>
+          <p:cNvSpPr/>
+          <p:nvPr/>
+        </p:nvSpPr>
+        <p:spPr>
+          <a:xfrm>
+            <a:off x="466230" y="3969990"/>
+            <a:ext cx="1656184" cy="720080"/>
+          </a:xfrm>
+          <a:prstGeom prst="roundRect">
+            <a:avLst/>
+          </a:prstGeom>
+        </p:spPr>
+        <p:style>
+          <a:lnRef idx="2">
+            <a:schemeClr val="accent1">
+              <a:shade val="50000"/>
+            </a:schemeClr>
+          </a:lnRef>
+          <a:fillRef idx="1">
+            <a:schemeClr val="accent1"/>
+          </a:fillRef>
+          <a:effectRef idx="0">
+            <a:schemeClr val="accent1"/>
+          </a:effectRef>
+          <a:fontRef idx="minor">
+            <a:schemeClr val="lt1"/>
+          </a:fontRef>
+        </p:style>
+        <p:txBody>
+          <a:bodyPr rtlCol="0" anchor="ctr"/>
+          <a:lstStyle/>
+          <a:p>
+            <a:pPr algn="ctr"/>
+            <a:r>
+              <a:rPr lang="en-US" dirty="0"/>
+              <a:t>HDD</a:t>
+            </a:r>
+            <a:endParaRPr lang="en-CA" dirty="0"/>
+          </a:p>
+        </p:txBody>
+      </p:sp>
+      <p:sp>
+        <p:nvSpPr>
+          <p:cNvPr id="6" name="Arrow: Up-Down 5">
+            <a:extLst>
+              <a:ext uri="{FF2B5EF4-FFF2-40B4-BE49-F238E27FC236}">
+                <a16:creationId xmlns:a16="http://schemas.microsoft.com/office/drawing/2014/main" id="{E716ED85-3AE2-2E40-993D-E001CB87D92E}"/>
+              </a:ext>
+            </a:extLst>
+          </p:cNvPr>
+          <p:cNvSpPr/>
+          <p:nvPr/>
+        </p:nvSpPr>
+        <p:spPr>
+          <a:xfrm>
+            <a:off x="963638" y="3033886"/>
+            <a:ext cx="648072" cy="906016"/>
+          </a:xfrm>
+          <a:prstGeom prst="upDownArrow">
+            <a:avLst>
+              <a:gd name="adj1" fmla="val 50000"/>
+              <a:gd name="adj2" fmla="val 26484"/>
+            </a:avLst>
+          </a:prstGeom>
+        </p:spPr>
+        <p:style>
+          <a:lnRef idx="2">
+            <a:schemeClr val="accent1">
+              <a:shade val="50000"/>
+            </a:schemeClr>
+          </a:lnRef>
+          <a:fillRef idx="1">
+            <a:schemeClr val="accent1"/>
+          </a:fillRef>
+          <a:effectRef idx="0">
+            <a:schemeClr val="accent1"/>
+          </a:effectRef>
+          <a:fontRef idx="minor">
+            <a:schemeClr val="lt1"/>
+          </a:fontRef>
+        </p:style>
+        <p:txBody>
+          <a:bodyPr rtlCol="0" anchor="ctr"/>
+          <a:lstStyle/>
+          <a:p>
+            <a:pPr algn="ctr"/>
+            <a:r>
+              <a:rPr lang="en-US" dirty="0"/>
+              <a:t>CODE</a:t>
+            </a:r>
+            <a:endParaRPr lang="en-CA" dirty="0"/>
+          </a:p>
+        </p:txBody>
+      </p:sp>
+      <p:sp>
+        <p:nvSpPr>
+          <p:cNvPr id="7" name="Rectangle: Rounded Corners 6">
+            <a:extLst>
+              <a:ext uri="{FF2B5EF4-FFF2-40B4-BE49-F238E27FC236}">
+                <a16:creationId xmlns:a16="http://schemas.microsoft.com/office/drawing/2014/main" id="{B924CF71-37E5-7DA2-B6BB-FA5A62A53D11}"/>
+              </a:ext>
+            </a:extLst>
+          </p:cNvPr>
+          <p:cNvSpPr/>
+          <p:nvPr/>
+        </p:nvSpPr>
+        <p:spPr>
+          <a:xfrm>
+            <a:off x="1907704" y="918456"/>
+            <a:ext cx="1008112" cy="323366"/>
+          </a:xfrm>
+          <a:prstGeom prst="roundRect">
+            <a:avLst/>
+          </a:prstGeom>
+        </p:spPr>
+        <p:style>
+          <a:lnRef idx="2">
+            <a:schemeClr val="accent1">
+              <a:shade val="50000"/>
+            </a:schemeClr>
+          </a:lnRef>
+          <a:fillRef idx="1">
+            <a:schemeClr val="accent1"/>
+          </a:fillRef>
+          <a:effectRef idx="0">
+            <a:schemeClr val="accent1"/>
+          </a:effectRef>
+          <a:fontRef idx="minor">
+            <a:schemeClr val="lt1"/>
+          </a:fontRef>
+        </p:style>
+        <p:txBody>
+          <a:bodyPr rtlCol="0" anchor="ctr"/>
+          <a:lstStyle/>
+          <a:p>
+            <a:pPr algn="ctr"/>
+            <a:r>
+              <a:rPr lang="en-US" sz="1400" dirty="0"/>
+              <a:t>32-1000</a:t>
+            </a:r>
+            <a:endParaRPr lang="en-CA" sz="1400" dirty="0"/>
+          </a:p>
+        </p:txBody>
+      </p:sp>
+      <p:sp>
+        <p:nvSpPr>
+          <p:cNvPr id="8" name="Rectangle: Rounded Corners 7">
+            <a:extLst>
+              <a:ext uri="{FF2B5EF4-FFF2-40B4-BE49-F238E27FC236}">
+                <a16:creationId xmlns:a16="http://schemas.microsoft.com/office/drawing/2014/main" id="{DE86D9BA-4DB7-DB17-3F04-03B28C575BAF}"/>
+              </a:ext>
+            </a:extLst>
+          </p:cNvPr>
+          <p:cNvSpPr/>
+          <p:nvPr/>
+        </p:nvSpPr>
+        <p:spPr>
+          <a:xfrm>
+            <a:off x="4344268" y="903412"/>
+            <a:ext cx="2437310" cy="720080"/>
+          </a:xfrm>
+          <a:prstGeom prst="roundRect">
+            <a:avLst/>
+          </a:prstGeom>
+        </p:spPr>
+        <p:style>
+          <a:lnRef idx="2">
+            <a:schemeClr val="accent1">
+              <a:shade val="50000"/>
+            </a:schemeClr>
+          </a:lnRef>
+          <a:fillRef idx="1">
+            <a:schemeClr val="accent1"/>
+          </a:fillRef>
+          <a:effectRef idx="0">
+            <a:schemeClr val="accent1"/>
+          </a:effectRef>
+          <a:fontRef idx="minor">
+            <a:schemeClr val="lt1"/>
+          </a:fontRef>
+        </p:style>
+        <p:txBody>
+          <a:bodyPr rtlCol="0" anchor="ctr"/>
+          <a:lstStyle/>
+          <a:p>
+            <a:pPr algn="ctr"/>
+            <a:r>
+              <a:rPr lang="en-US" dirty="0"/>
+              <a:t>GPU : 6144 Core</a:t>
+            </a:r>
+            <a:endParaRPr lang="en-CA" dirty="0"/>
+          </a:p>
+        </p:txBody>
+      </p:sp>
+      <p:sp>
+        <p:nvSpPr>
+          <p:cNvPr id="9" name="Rectangle: Rounded Corners 8">
+            <a:extLst>
+              <a:ext uri="{FF2B5EF4-FFF2-40B4-BE49-F238E27FC236}">
+                <a16:creationId xmlns:a16="http://schemas.microsoft.com/office/drawing/2014/main" id="{A3CB8FE8-E4B1-3417-96BC-59508106B601}"/>
+              </a:ext>
+            </a:extLst>
+          </p:cNvPr>
+          <p:cNvSpPr/>
+          <p:nvPr/>
+        </p:nvSpPr>
+        <p:spPr>
+          <a:xfrm>
+            <a:off x="4692029" y="2313806"/>
+            <a:ext cx="1867718" cy="720080"/>
+          </a:xfrm>
+          <a:prstGeom prst="roundRect">
+            <a:avLst/>
+          </a:prstGeom>
+        </p:spPr>
+        <p:style>
+          <a:lnRef idx="2">
+            <a:schemeClr val="accent1">
+              <a:shade val="50000"/>
+            </a:schemeClr>
+          </a:lnRef>
+          <a:fillRef idx="1">
+            <a:schemeClr val="accent1"/>
+          </a:fillRef>
+          <a:effectRef idx="0">
+            <a:schemeClr val="accent1"/>
+          </a:effectRef>
+          <a:fontRef idx="minor">
+            <a:schemeClr val="lt1"/>
+          </a:fontRef>
+        </p:style>
+        <p:txBody>
+          <a:bodyPr rtlCol="0" anchor="ctr"/>
+          <a:lstStyle/>
+          <a:p>
+            <a:pPr algn="ctr"/>
+            <a:r>
+              <a:rPr lang="en-US" dirty="0"/>
+              <a:t>RAM 8G</a:t>
+            </a:r>
+            <a:endParaRPr lang="en-CA" dirty="0"/>
+          </a:p>
+        </p:txBody>
+      </p:sp>
+      <p:sp>
+        <p:nvSpPr>
+          <p:cNvPr id="10" name="Arrow: Up-Down 9">
+            <a:extLst>
+              <a:ext uri="{FF2B5EF4-FFF2-40B4-BE49-F238E27FC236}">
+                <a16:creationId xmlns:a16="http://schemas.microsoft.com/office/drawing/2014/main" id="{62DA1621-8500-691F-600A-8B14480EAA75}"/>
+              </a:ext>
+            </a:extLst>
+          </p:cNvPr>
+          <p:cNvSpPr/>
+          <p:nvPr/>
+        </p:nvSpPr>
+        <p:spPr>
+          <a:xfrm>
+            <a:off x="5292080" y="1638536"/>
+            <a:ext cx="648072" cy="720080"/>
+          </a:xfrm>
+          <a:prstGeom prst="upDownArrow">
+            <a:avLst>
+              <a:gd name="adj1" fmla="val 50000"/>
+              <a:gd name="adj2" fmla="val 26484"/>
+            </a:avLst>
+          </a:prstGeom>
+        </p:spPr>
+        <p:style>
+          <a:lnRef idx="2">
+            <a:schemeClr val="accent1">
+              <a:shade val="50000"/>
+            </a:schemeClr>
+          </a:lnRef>
+          <a:fillRef idx="1">
+            <a:schemeClr val="accent1"/>
+          </a:fillRef>
+          <a:effectRef idx="0">
+            <a:schemeClr val="accent1"/>
+          </a:effectRef>
+          <a:fontRef idx="minor">
+            <a:schemeClr val="lt1"/>
+          </a:fontRef>
+        </p:style>
+        <p:txBody>
+          <a:bodyPr rtlCol="0" anchor="ctr"/>
+          <a:lstStyle/>
+          <a:p>
+            <a:pPr algn="ctr"/>
+            <a:r>
+              <a:rPr lang="en-US" dirty="0"/>
+              <a:t>Code</a:t>
+            </a:r>
+            <a:endParaRPr lang="en-CA" dirty="0"/>
+          </a:p>
+        </p:txBody>
+      </p:sp>
+      <p:sp>
+        <p:nvSpPr>
+          <p:cNvPr id="13" name="Rectangle: Rounded Corners 12">
+            <a:extLst>
+              <a:ext uri="{FF2B5EF4-FFF2-40B4-BE49-F238E27FC236}">
+                <a16:creationId xmlns:a16="http://schemas.microsoft.com/office/drawing/2014/main" id="{6435AFC8-6E94-B69B-F8FE-CAF13DC60998}"/>
+              </a:ext>
+            </a:extLst>
+          </p:cNvPr>
+          <p:cNvSpPr/>
+          <p:nvPr/>
+        </p:nvSpPr>
+        <p:spPr>
+          <a:xfrm>
+            <a:off x="6732240" y="918456"/>
+            <a:ext cx="1440160" cy="390128"/>
+          </a:xfrm>
+          <a:prstGeom prst="roundRect">
+            <a:avLst/>
+          </a:prstGeom>
+        </p:spPr>
+        <p:style>
+          <a:lnRef idx="2">
+            <a:schemeClr val="accent1">
+              <a:shade val="50000"/>
+            </a:schemeClr>
+          </a:lnRef>
+          <a:fillRef idx="1">
+            <a:schemeClr val="accent1"/>
+          </a:fillRef>
+          <a:effectRef idx="0">
+            <a:schemeClr val="accent1"/>
+          </a:effectRef>
+          <a:fontRef idx="minor">
+            <a:schemeClr val="lt1"/>
+          </a:fontRef>
+        </p:style>
+        <p:txBody>
+          <a:bodyPr rtlCol="0" anchor="ctr"/>
+          <a:lstStyle/>
+          <a:p>
+            <a:pPr algn="ctr"/>
+            <a:r>
+              <a:rPr lang="en-US" sz="1400" dirty="0"/>
+              <a:t>65,000 REG</a:t>
+            </a:r>
+            <a:endParaRPr lang="en-CA" sz="1400" dirty="0"/>
+          </a:p>
+        </p:txBody>
+      </p:sp>
+      <p:sp>
+        <p:nvSpPr>
+          <p:cNvPr id="14" name="Arrow: Up-Down 13">
+            <a:extLst>
+              <a:ext uri="{FF2B5EF4-FFF2-40B4-BE49-F238E27FC236}">
+                <a16:creationId xmlns:a16="http://schemas.microsoft.com/office/drawing/2014/main" id="{F87A5F6B-CAC9-0BCD-1C94-B828CC0D18F7}"/>
+              </a:ext>
+            </a:extLst>
+          </p:cNvPr>
+          <p:cNvSpPr/>
+          <p:nvPr/>
+        </p:nvSpPr>
+        <p:spPr>
+          <a:xfrm rot="16200000">
+            <a:off x="3132745" y="1491195"/>
+            <a:ext cx="648072" cy="2437309"/>
+          </a:xfrm>
+          <a:prstGeom prst="upDownArrow">
+            <a:avLst>
+              <a:gd name="adj1" fmla="val 50000"/>
+              <a:gd name="adj2" fmla="val 26484"/>
+            </a:avLst>
+          </a:prstGeom>
+        </p:spPr>
+        <p:style>
+          <a:lnRef idx="2">
+            <a:schemeClr val="accent1">
+              <a:shade val="50000"/>
+            </a:schemeClr>
+          </a:lnRef>
+          <a:fillRef idx="1">
+            <a:schemeClr val="accent1"/>
+          </a:fillRef>
+          <a:effectRef idx="0">
+            <a:schemeClr val="accent1"/>
+          </a:effectRef>
+          <a:fontRef idx="minor">
+            <a:schemeClr val="lt1"/>
+          </a:fontRef>
+        </p:style>
+        <p:txBody>
+          <a:bodyPr rtlCol="0" anchor="ctr"/>
+          <a:lstStyle/>
+          <a:p>
+            <a:pPr algn="ctr"/>
+            <a:r>
+              <a:rPr lang="en-US" dirty="0"/>
+              <a:t>CODE</a:t>
+            </a:r>
+            <a:endParaRPr lang="en-CA" dirty="0"/>
+          </a:p>
+        </p:txBody>
+      </p:sp>
     </p:spTree>
+  </p:cSld>
+  <p:clrMapOvr>
+    <a:masterClrMapping/>
+  </p:clrMapOvr>
+</p:sld>
+</file>
+
+<file path=ppt/slides/slide42.xml><?xml version="1.0" encoding="utf-8"?>
+<p:sld xmlns:a="http://schemas.openxmlformats.org/drawingml/2006/main" xmlns:r="http://schemas.openxmlformats.org/officeDocument/2006/relationships" xmlns:p="http://schemas.openxmlformats.org/presentationml/2006/main">
+  <p:cSld>
+    <p:spTree>
+      <p:nvGrpSpPr>
+        <p:cNvPr id="1" name=""/>
+        <p:cNvGrpSpPr/>
+        <p:nvPr/>
+      </p:nvGrpSpPr>
+      <p:grpSpPr>
+        <a:xfrm>
+          <a:off x="0" y="0"/>
+          <a:ext cx="0" cy="0"/>
+          <a:chOff x="0" y="0"/>
+          <a:chExt cx="0" cy="0"/>
+        </a:xfrm>
+      </p:grpSpPr>
+      <p:sp>
+        <p:nvSpPr>
+          <p:cNvPr id="2" name="Title 1">
+            <a:extLst>
+              <a:ext uri="{FF2B5EF4-FFF2-40B4-BE49-F238E27FC236}">
+                <a16:creationId xmlns:a16="http://schemas.microsoft.com/office/drawing/2014/main" id="{0F77EE77-75A7-E37F-FC9E-D99D1A74D602}"/>
+              </a:ext>
+            </a:extLst>
+          </p:cNvPr>
+          <p:cNvSpPr>
+            <a:spLocks noGrp="1"/>
+          </p:cNvSpPr>
+          <p:nvPr>
+            <p:ph type="title"/>
+          </p:nvPr>
+        </p:nvSpPr>
+        <p:spPr/>
+        <p:txBody>
+          <a:bodyPr/>
+          <a:lstStyle/>
+          <a:p>
+            <a:r>
+              <a:rPr lang="en-US" dirty="0"/>
+              <a:t>Mike Acton ; 3 lies</a:t>
+            </a:r>
+            <a:endParaRPr lang="en-CA" dirty="0"/>
+          </a:p>
+        </p:txBody>
+      </p:sp>
+      <p:sp>
+        <p:nvSpPr>
+          <p:cNvPr id="3" name="Content Placeholder 2">
+            <a:extLst>
+              <a:ext uri="{FF2B5EF4-FFF2-40B4-BE49-F238E27FC236}">
+                <a16:creationId xmlns:a16="http://schemas.microsoft.com/office/drawing/2014/main" id="{4B791EBD-6693-3009-EFC3-1BB1B7DFB9E1}"/>
+              </a:ext>
+            </a:extLst>
+          </p:cNvPr>
+          <p:cNvSpPr>
+            <a:spLocks noGrp="1"/>
+          </p:cNvSpPr>
+          <p:nvPr>
+            <p:ph idx="1"/>
+          </p:nvPr>
+        </p:nvSpPr>
+        <p:spPr/>
+        <p:txBody>
+          <a:bodyPr/>
+          <a:lstStyle/>
+          <a:p>
+            <a:r>
+              <a:rPr lang="en-CA" sz="1400" dirty="0">
+                <a:hlinkClick r:id="rId2"/>
+              </a:rPr>
+              <a:t>https://cellperformance.beyond3d.com/articles/2008/03/three-big-lies.html</a:t>
+            </a:r>
+            <a:endParaRPr lang="en-CA" sz="1400" dirty="0"/>
+          </a:p>
+          <a:p>
+            <a:r>
+              <a:rPr lang="en-CA" dirty="0"/>
+              <a:t>Software is a platform</a:t>
+            </a:r>
+          </a:p>
+          <a:p>
+            <a:pPr lvl="1"/>
+            <a:r>
+              <a:rPr lang="en-CA" dirty="0"/>
+              <a:t>PS3 game -&gt; Atari 2600 </a:t>
+            </a:r>
+          </a:p>
+          <a:p>
+            <a:r>
+              <a:rPr lang="en-CA" dirty="0"/>
+              <a:t>Code should be designed around a model of the world</a:t>
+            </a:r>
+          </a:p>
+          <a:p>
+            <a:r>
+              <a:rPr lang="en-CA" dirty="0"/>
+              <a:t>Code is more important than data</a:t>
+            </a:r>
+          </a:p>
+        </p:txBody>
+      </p:sp>
+    </p:spTree>
+    <p:extLst>
+      <p:ext uri="{BB962C8B-B14F-4D97-AF65-F5344CB8AC3E}">
+        <p14:creationId xmlns:p14="http://schemas.microsoft.com/office/powerpoint/2010/main" val="1694738770"/>
+      </p:ext>
+    </p:extLst>
+  </p:cSld>
+  <p:clrMapOvr>
+    <a:masterClrMapping/>
+  </p:clrMapOvr>
+</p:sld>
+</file>
+
+<file path=ppt/slides/slide43.xml><?xml version="1.0" encoding="utf-8"?>
+<p:sld xmlns:a="http://schemas.openxmlformats.org/drawingml/2006/main" xmlns:r="http://schemas.openxmlformats.org/officeDocument/2006/relationships" xmlns:p="http://schemas.openxmlformats.org/presentationml/2006/main">
+  <p:cSld>
+    <p:spTree>
+      <p:nvGrpSpPr>
+        <p:cNvPr id="1" name=""/>
+        <p:cNvGrpSpPr/>
+        <p:nvPr/>
+      </p:nvGrpSpPr>
+      <p:grpSpPr>
+        <a:xfrm>
+          <a:off x="0" y="0"/>
+          <a:ext cx="0" cy="0"/>
+          <a:chOff x="0" y="0"/>
+          <a:chExt cx="0" cy="0"/>
+        </a:xfrm>
+      </p:grpSpPr>
+      <p:sp>
+        <p:nvSpPr>
+          <p:cNvPr id="4" name="Rectangle: Rounded Corners 3">
+            <a:extLst>
+              <a:ext uri="{FF2B5EF4-FFF2-40B4-BE49-F238E27FC236}">
+                <a16:creationId xmlns:a16="http://schemas.microsoft.com/office/drawing/2014/main" id="{C1464A7A-E8EF-DCF1-A872-962EF6B40440}"/>
+              </a:ext>
+            </a:extLst>
+          </p:cNvPr>
+          <p:cNvSpPr/>
+          <p:nvPr/>
+        </p:nvSpPr>
+        <p:spPr>
+          <a:xfrm>
+            <a:off x="3442742" y="1635646"/>
+            <a:ext cx="2088232" cy="1512168"/>
+          </a:xfrm>
+          <a:prstGeom prst="roundRect">
+            <a:avLst/>
+          </a:prstGeom>
+        </p:spPr>
+        <p:style>
+          <a:lnRef idx="2">
+            <a:schemeClr val="accent1">
+              <a:shade val="50000"/>
+            </a:schemeClr>
+          </a:lnRef>
+          <a:fillRef idx="1">
+            <a:schemeClr val="accent1"/>
+          </a:fillRef>
+          <a:effectRef idx="0">
+            <a:schemeClr val="accent1"/>
+          </a:effectRef>
+          <a:fontRef idx="minor">
+            <a:schemeClr val="lt1"/>
+          </a:fontRef>
+        </p:style>
+        <p:txBody>
+          <a:bodyPr rtlCol="0" anchor="ctr"/>
+          <a:lstStyle/>
+          <a:p>
+            <a:pPr algn="ctr"/>
+            <a:r>
+              <a:rPr lang="en-US"/>
+              <a:t>Code</a:t>
+            </a:r>
+            <a:endParaRPr lang="en-US" dirty="0"/>
+          </a:p>
+        </p:txBody>
+      </p:sp>
+      <p:sp>
+        <p:nvSpPr>
+          <p:cNvPr id="5" name="Rectangle: Rounded Corners 4">
+            <a:extLst>
+              <a:ext uri="{FF2B5EF4-FFF2-40B4-BE49-F238E27FC236}">
+                <a16:creationId xmlns:a16="http://schemas.microsoft.com/office/drawing/2014/main" id="{761E7784-2EF7-3EC8-0C9E-94D40F911199}"/>
+              </a:ext>
+            </a:extLst>
+          </p:cNvPr>
+          <p:cNvSpPr/>
+          <p:nvPr/>
+        </p:nvSpPr>
+        <p:spPr>
+          <a:xfrm>
+            <a:off x="395536" y="1635646"/>
+            <a:ext cx="2088232" cy="1512168"/>
+          </a:xfrm>
+          <a:prstGeom prst="roundRect">
+            <a:avLst/>
+          </a:prstGeom>
+        </p:spPr>
+        <p:style>
+          <a:lnRef idx="2">
+            <a:schemeClr val="accent1">
+              <a:shade val="50000"/>
+            </a:schemeClr>
+          </a:lnRef>
+          <a:fillRef idx="1">
+            <a:schemeClr val="accent1"/>
+          </a:fillRef>
+          <a:effectRef idx="0">
+            <a:schemeClr val="accent1"/>
+          </a:effectRef>
+          <a:fontRef idx="minor">
+            <a:schemeClr val="lt1"/>
+          </a:fontRef>
+        </p:style>
+        <p:txBody>
+          <a:bodyPr rtlCol="0" anchor="ctr"/>
+          <a:lstStyle/>
+          <a:p>
+            <a:pPr algn="ctr"/>
+            <a:r>
+              <a:rPr lang="en-US" dirty="0"/>
+              <a:t>Data</a:t>
+            </a:r>
+            <a:endParaRPr lang="en-CA" dirty="0"/>
+          </a:p>
+        </p:txBody>
+      </p:sp>
+      <p:sp>
+        <p:nvSpPr>
+          <p:cNvPr id="6" name="Rectangle: Rounded Corners 5">
+            <a:extLst>
+              <a:ext uri="{FF2B5EF4-FFF2-40B4-BE49-F238E27FC236}">
+                <a16:creationId xmlns:a16="http://schemas.microsoft.com/office/drawing/2014/main" id="{FA074E63-ECFF-99C5-2A6E-80B08709B1F4}"/>
+              </a:ext>
+            </a:extLst>
+          </p:cNvPr>
+          <p:cNvSpPr/>
+          <p:nvPr/>
+        </p:nvSpPr>
+        <p:spPr>
+          <a:xfrm>
+            <a:off x="6444208" y="1635646"/>
+            <a:ext cx="2088232" cy="1512168"/>
+          </a:xfrm>
+          <a:prstGeom prst="roundRect">
+            <a:avLst/>
+          </a:prstGeom>
+        </p:spPr>
+        <p:style>
+          <a:lnRef idx="2">
+            <a:schemeClr val="accent1">
+              <a:shade val="50000"/>
+            </a:schemeClr>
+          </a:lnRef>
+          <a:fillRef idx="1">
+            <a:schemeClr val="accent1"/>
+          </a:fillRef>
+          <a:effectRef idx="0">
+            <a:schemeClr val="accent1"/>
+          </a:effectRef>
+          <a:fontRef idx="minor">
+            <a:schemeClr val="lt1"/>
+          </a:fontRef>
+        </p:style>
+        <p:txBody>
+          <a:bodyPr rtlCol="0" anchor="ctr"/>
+          <a:lstStyle/>
+          <a:p>
+            <a:pPr algn="ctr"/>
+            <a:r>
+              <a:rPr lang="en-US" dirty="0"/>
+              <a:t>Data</a:t>
+            </a:r>
+            <a:endParaRPr lang="en-CA" dirty="0"/>
+          </a:p>
+        </p:txBody>
+      </p:sp>
+      <p:sp>
+        <p:nvSpPr>
+          <p:cNvPr id="7" name="Arrow: Right 6">
+            <a:extLst>
+              <a:ext uri="{FF2B5EF4-FFF2-40B4-BE49-F238E27FC236}">
+                <a16:creationId xmlns:a16="http://schemas.microsoft.com/office/drawing/2014/main" id="{842CD640-250C-148F-A400-C74A6FAFFA06}"/>
+              </a:ext>
+            </a:extLst>
+          </p:cNvPr>
+          <p:cNvSpPr/>
+          <p:nvPr/>
+        </p:nvSpPr>
+        <p:spPr>
+          <a:xfrm>
+            <a:off x="2562548" y="2128974"/>
+            <a:ext cx="886966" cy="576064"/>
+          </a:xfrm>
+          <a:prstGeom prst="rightArrow">
+            <a:avLst/>
+          </a:prstGeom>
+        </p:spPr>
+        <p:style>
+          <a:lnRef idx="2">
+            <a:schemeClr val="accent1">
+              <a:shade val="50000"/>
+            </a:schemeClr>
+          </a:lnRef>
+          <a:fillRef idx="1">
+            <a:schemeClr val="accent1"/>
+          </a:fillRef>
+          <a:effectRef idx="0">
+            <a:schemeClr val="accent1"/>
+          </a:effectRef>
+          <a:fontRef idx="minor">
+            <a:schemeClr val="lt1"/>
+          </a:fontRef>
+        </p:style>
+        <p:txBody>
+          <a:bodyPr rtlCol="0" anchor="ctr"/>
+          <a:lstStyle/>
+          <a:p>
+            <a:pPr algn="ctr"/>
+            <a:endParaRPr lang="en-CA"/>
+          </a:p>
+        </p:txBody>
+      </p:sp>
+      <p:sp>
+        <p:nvSpPr>
+          <p:cNvPr id="8" name="Arrow: Right 7">
+            <a:extLst>
+              <a:ext uri="{FF2B5EF4-FFF2-40B4-BE49-F238E27FC236}">
+                <a16:creationId xmlns:a16="http://schemas.microsoft.com/office/drawing/2014/main" id="{8C7E3D05-A11C-FD39-D513-95EFD5DB0DA4}"/>
+              </a:ext>
+            </a:extLst>
+          </p:cNvPr>
+          <p:cNvSpPr/>
+          <p:nvPr/>
+        </p:nvSpPr>
+        <p:spPr>
+          <a:xfrm>
+            <a:off x="5569074" y="2103698"/>
+            <a:ext cx="886966" cy="576064"/>
+          </a:xfrm>
+          <a:prstGeom prst="rightArrow">
+            <a:avLst/>
+          </a:prstGeom>
+        </p:spPr>
+        <p:style>
+          <a:lnRef idx="2">
+            <a:schemeClr val="accent1">
+              <a:shade val="50000"/>
+            </a:schemeClr>
+          </a:lnRef>
+          <a:fillRef idx="1">
+            <a:schemeClr val="accent1"/>
+          </a:fillRef>
+          <a:effectRef idx="0">
+            <a:schemeClr val="accent1"/>
+          </a:effectRef>
+          <a:fontRef idx="minor">
+            <a:schemeClr val="lt1"/>
+          </a:fontRef>
+        </p:style>
+        <p:txBody>
+          <a:bodyPr rtlCol="0" anchor="ctr"/>
+          <a:lstStyle/>
+          <a:p>
+            <a:pPr algn="ctr"/>
+            <a:endParaRPr lang="en-CA"/>
+          </a:p>
+        </p:txBody>
+      </p:sp>
+    </p:spTree>
+    <p:extLst>
+      <p:ext uri="{BB962C8B-B14F-4D97-AF65-F5344CB8AC3E}">
+        <p14:creationId xmlns:p14="http://schemas.microsoft.com/office/powerpoint/2010/main" val="1128960810"/>
+      </p:ext>
+    </p:extLst>
   </p:cSld>
   <p:clrMapOvr>
     <a:masterClrMapping/>
@@ -30843,7 +31858,7 @@
             </a:r>
             <a:r>
               <a:rPr lang="en-CA" sz="2000" dirty="0"/>
-              <a:t>2019 Community Edition</a:t>
+              <a:t>2019/2022 Community Edition</a:t>
             </a:r>
           </a:p>
           <a:p>
@@ -30861,7 +31876,7 @@
             </a:br>
             <a:r>
               <a:rPr lang="en-CA" sz="1800" dirty="0"/>
-              <a:t>(I’ve got 2008-2019 installed)</a:t>
+              <a:t>(I’ve got 2017, 2019, 2022 installed)</a:t>
             </a:r>
           </a:p>
           <a:p>
@@ -31696,7 +32711,7 @@
         </p:blipFill>
         <p:spPr bwMode="auto">
           <a:xfrm>
-            <a:off x="4067944" y="2988365"/>
+            <a:off x="4101543" y="3023284"/>
             <a:ext cx="1224136" cy="1846996"/>
           </a:xfrm>
           <a:prstGeom prst="rect">
@@ -31814,7 +32829,7 @@
         </p:blipFill>
         <p:spPr bwMode="auto">
           <a:xfrm>
-            <a:off x="5352120" y="2991393"/>
+            <a:off x="5385719" y="3026312"/>
             <a:ext cx="1486238" cy="1843967"/>
           </a:xfrm>
           <a:prstGeom prst="rect">

</xml_diff>

<commit_message>
A triangle of death! Yikes!
</commit_message>
<xml_diff>
--- a/Day2Day/Day_1 (Tues, June 27th, 2022)/INFO3111S22_W01_Course_Intro (long and boring PPT).pptx
+++ b/Day2Day/Day_1 (Tues, June 27th, 2022)/INFO3111S22_W01_Course_Intro (long and boring PPT).pptx
@@ -5,7 +5,7 @@
     <p:sldMasterId id="2147483648" r:id="rId1"/>
   </p:sldMasterIdLst>
   <p:notesMasterIdLst>
-    <p:notesMasterId r:id="rId45"/>
+    <p:notesMasterId r:id="rId47"/>
   </p:notesMasterIdLst>
   <p:sldIdLst>
     <p:sldId id="305" r:id="rId2"/>
@@ -51,6 +51,8 @@
     <p:sldId id="304" r:id="rId42"/>
     <p:sldId id="322" r:id="rId43"/>
     <p:sldId id="323" r:id="rId44"/>
+    <p:sldId id="324" r:id="rId45"/>
+    <p:sldId id="325" r:id="rId46"/>
   </p:sldIdLst>
   <p:sldSz cx="9144000" cy="5143500" type="screen16x9"/>
   <p:notesSz cx="6858000" cy="9144000"/>
@@ -30889,6 +30891,252 @@
     <p:extLst>
       <p:ext uri="{BB962C8B-B14F-4D97-AF65-F5344CB8AC3E}">
         <p14:creationId xmlns:p14="http://schemas.microsoft.com/office/powerpoint/2010/main" val="1128960810"/>
+      </p:ext>
+    </p:extLst>
+  </p:cSld>
+  <p:clrMapOvr>
+    <a:masterClrMapping/>
+  </p:clrMapOvr>
+</p:sld>
+</file>
+
+<file path=ppt/slides/slide44.xml><?xml version="1.0" encoding="utf-8"?>
+<p:sld xmlns:a="http://schemas.openxmlformats.org/drawingml/2006/main" xmlns:r="http://schemas.openxmlformats.org/officeDocument/2006/relationships" xmlns:p="http://schemas.openxmlformats.org/presentationml/2006/main">
+  <p:cSld>
+    <p:spTree>
+      <p:nvGrpSpPr>
+        <p:cNvPr id="1" name=""/>
+        <p:cNvGrpSpPr/>
+        <p:nvPr/>
+      </p:nvGrpSpPr>
+      <p:grpSpPr>
+        <a:xfrm>
+          <a:off x="0" y="0"/>
+          <a:ext cx="0" cy="0"/>
+          <a:chOff x="0" y="0"/>
+          <a:chExt cx="0" cy="0"/>
+        </a:xfrm>
+      </p:grpSpPr>
+      <p:sp>
+        <p:nvSpPr>
+          <p:cNvPr id="2" name="Title 1">
+            <a:extLst>
+              <a:ext uri="{FF2B5EF4-FFF2-40B4-BE49-F238E27FC236}">
+                <a16:creationId xmlns:a16="http://schemas.microsoft.com/office/drawing/2014/main" id="{7F5A0959-0802-D5A9-346E-F1A8197DA891}"/>
+              </a:ext>
+            </a:extLst>
+          </p:cNvPr>
+          <p:cNvSpPr>
+            <a:spLocks noGrp="1"/>
+          </p:cNvSpPr>
+          <p:nvPr>
+            <p:ph type="title"/>
+          </p:nvPr>
+        </p:nvSpPr>
+        <p:spPr/>
+        <p:txBody>
+          <a:bodyPr/>
+          <a:lstStyle/>
+          <a:p>
+            <a:r>
+              <a:rPr lang="en-US" dirty="0"/>
+              <a:t>OpenGL libraries, etc.</a:t>
+            </a:r>
+            <a:endParaRPr lang="en-CA" dirty="0"/>
+          </a:p>
+        </p:txBody>
+      </p:sp>
+      <p:sp>
+        <p:nvSpPr>
+          <p:cNvPr id="3" name="Content Placeholder 2">
+            <a:extLst>
+              <a:ext uri="{FF2B5EF4-FFF2-40B4-BE49-F238E27FC236}">
+                <a16:creationId xmlns:a16="http://schemas.microsoft.com/office/drawing/2014/main" id="{964D8DC7-7474-3140-C954-63F4B24AB7AB}"/>
+              </a:ext>
+            </a:extLst>
+          </p:cNvPr>
+          <p:cNvSpPr>
+            <a:spLocks noGrp="1"/>
+          </p:cNvSpPr>
+          <p:nvPr>
+            <p:ph idx="1"/>
+          </p:nvPr>
+        </p:nvSpPr>
+        <p:spPr/>
+        <p:txBody>
+          <a:bodyPr/>
+          <a:lstStyle/>
+          <a:p>
+            <a:r>
+              <a:rPr lang="en-US" dirty="0"/>
+              <a:t>OurProgram.cpp </a:t>
+            </a:r>
+            <a:r>
+              <a:rPr lang="en-US" dirty="0">
+                <a:sym typeface="Wingdings" panose="05000000000000000000" pitchFamily="2" charset="2"/>
+              </a:rPr>
+              <a:t> .obj</a:t>
+            </a:r>
+          </a:p>
+          <a:p>
+            <a:r>
+              <a:rPr lang="en-US" dirty="0" err="1">
+                <a:sym typeface="Wingdings" panose="05000000000000000000" pitchFamily="2" charset="2"/>
+              </a:rPr>
+              <a:t>glCreateShader</a:t>
+            </a:r>
+            <a:r>
+              <a:rPr lang="en-US" dirty="0">
+                <a:sym typeface="Wingdings" panose="05000000000000000000" pitchFamily="2" charset="2"/>
+              </a:rPr>
+              <a:t>()  library (.lib)</a:t>
+            </a:r>
+          </a:p>
+          <a:p>
+            <a:r>
+              <a:rPr lang="en-US" dirty="0">
+                <a:sym typeface="Wingdings" panose="05000000000000000000" pitchFamily="2" charset="2"/>
+              </a:rPr>
+              <a:t>Linker: </a:t>
+            </a:r>
+          </a:p>
+          <a:p>
+            <a:pPr lvl="1"/>
+            <a:r>
+              <a:rPr lang="en-US" dirty="0">
+                <a:sym typeface="Wingdings" panose="05000000000000000000" pitchFamily="2" charset="2"/>
+              </a:rPr>
+              <a:t>Combine these  exe</a:t>
+            </a:r>
+            <a:endParaRPr lang="en-CA" dirty="0"/>
+          </a:p>
+        </p:txBody>
+      </p:sp>
+    </p:spTree>
+    <p:extLst>
+      <p:ext uri="{BB962C8B-B14F-4D97-AF65-F5344CB8AC3E}">
+        <p14:creationId xmlns:p14="http://schemas.microsoft.com/office/powerpoint/2010/main" val="1199520036"/>
+      </p:ext>
+    </p:extLst>
+  </p:cSld>
+  <p:clrMapOvr>
+    <a:masterClrMapping/>
+  </p:clrMapOvr>
+</p:sld>
+</file>
+
+<file path=ppt/slides/slide45.xml><?xml version="1.0" encoding="utf-8"?>
+<p:sld xmlns:a="http://schemas.openxmlformats.org/drawingml/2006/main" xmlns:r="http://schemas.openxmlformats.org/officeDocument/2006/relationships" xmlns:p="http://schemas.openxmlformats.org/presentationml/2006/main">
+  <p:cSld>
+    <p:spTree>
+      <p:nvGrpSpPr>
+        <p:cNvPr id="1" name=""/>
+        <p:cNvGrpSpPr/>
+        <p:nvPr/>
+      </p:nvGrpSpPr>
+      <p:grpSpPr>
+        <a:xfrm>
+          <a:off x="0" y="0"/>
+          <a:ext cx="0" cy="0"/>
+          <a:chOff x="0" y="0"/>
+          <a:chExt cx="0" cy="0"/>
+        </a:xfrm>
+      </p:grpSpPr>
+      <p:sp>
+        <p:nvSpPr>
+          <p:cNvPr id="2" name="Title 1">
+            <a:extLst>
+              <a:ext uri="{FF2B5EF4-FFF2-40B4-BE49-F238E27FC236}">
+                <a16:creationId xmlns:a16="http://schemas.microsoft.com/office/drawing/2014/main" id="{7F5A0959-0802-D5A9-346E-F1A8197DA891}"/>
+              </a:ext>
+            </a:extLst>
+          </p:cNvPr>
+          <p:cNvSpPr>
+            <a:spLocks noGrp="1"/>
+          </p:cNvSpPr>
+          <p:nvPr>
+            <p:ph type="title"/>
+          </p:nvPr>
+        </p:nvSpPr>
+        <p:spPr/>
+        <p:txBody>
+          <a:bodyPr/>
+          <a:lstStyle/>
+          <a:p>
+            <a:r>
+              <a:rPr lang="en-US" dirty="0"/>
+              <a:t>OpenGL libraries, etc.</a:t>
+            </a:r>
+            <a:endParaRPr lang="en-CA" dirty="0"/>
+          </a:p>
+        </p:txBody>
+      </p:sp>
+      <p:sp>
+        <p:nvSpPr>
+          <p:cNvPr id="3" name="Content Placeholder 2">
+            <a:extLst>
+              <a:ext uri="{FF2B5EF4-FFF2-40B4-BE49-F238E27FC236}">
+                <a16:creationId xmlns:a16="http://schemas.microsoft.com/office/drawing/2014/main" id="{964D8DC7-7474-3140-C954-63F4B24AB7AB}"/>
+              </a:ext>
+            </a:extLst>
+          </p:cNvPr>
+          <p:cNvSpPr>
+            <a:spLocks noGrp="1"/>
+          </p:cNvSpPr>
+          <p:nvPr>
+            <p:ph idx="1"/>
+          </p:nvPr>
+        </p:nvSpPr>
+        <p:spPr/>
+        <p:txBody>
+          <a:bodyPr/>
+          <a:lstStyle/>
+          <a:p>
+            <a:r>
+              <a:rPr lang="en-US" dirty="0"/>
+              <a:t>Where are the OpenGL calls? </a:t>
+            </a:r>
+          </a:p>
+          <a:p>
+            <a:pPr lvl="1"/>
+            <a:r>
+              <a:rPr lang="en-US" dirty="0"/>
+              <a:t>Glad: https://glad.dav1d.de/</a:t>
+            </a:r>
+          </a:p>
+          <a:p>
+            <a:r>
+              <a:rPr lang="en-US" dirty="0"/>
+              <a:t>OpenGL knows nothing about the OS or the screen</a:t>
+            </a:r>
+          </a:p>
+          <a:p>
+            <a:pPr lvl="1"/>
+            <a:r>
+              <a:rPr lang="en-US" dirty="0"/>
+              <a:t>GLFW – windows, mouse, keyboard, etc.</a:t>
+            </a:r>
+          </a:p>
+          <a:p>
+            <a:r>
+              <a:rPr lang="en-CA" dirty="0"/>
+              <a:t>Math: </a:t>
+            </a:r>
+          </a:p>
+          <a:p>
+            <a:pPr lvl="1"/>
+            <a:r>
+              <a:rPr lang="en-CA" dirty="0" err="1"/>
+              <a:t>glm</a:t>
+            </a:r>
+            <a:endParaRPr lang="en-CA" dirty="0"/>
+          </a:p>
+        </p:txBody>
+      </p:sp>
+    </p:spTree>
+    <p:extLst>
+      <p:ext uri="{BB962C8B-B14F-4D97-AF65-F5344CB8AC3E}">
+        <p14:creationId xmlns:p14="http://schemas.microsoft.com/office/powerpoint/2010/main" val="2901373973"/>
       </p:ext>
     </p:extLst>
   </p:cSld>

</xml_diff>